<commit_message>
petit fix de derniere minute
</commit_message>
<xml_diff>
--- a/pres_api.pptx
+++ b/pres_api.pptx
@@ -21,42 +21,42 @@
   <p:notesSz cx="6858000" cy="9144000"/>
   <p:embeddedFontLst>
     <p:embeddedFont>
-      <p:font typeface="Saira Extra Condensed" panose="020B0604020202020204" charset="0"/>
+      <p:font typeface="Saira ExtraCondensed SemiBold" panose="020B0604020202020204" charset="0"/>
       <p:regular r:id="rId11"/>
       <p:bold r:id="rId12"/>
     </p:embeddedFont>
     <p:embeddedFont>
-      <p:font typeface="Fira Sans Extra Condensed Medium" panose="020B0604020202020204" charset="0"/>
+      <p:font typeface="Barlow Semi Condensed Light" panose="020B0604020202020204" charset="0"/>
       <p:regular r:id="rId13"/>
       <p:bold r:id="rId14"/>
       <p:italic r:id="rId15"/>
       <p:boldItalic r:id="rId16"/>
     </p:embeddedFont>
     <p:embeddedFont>
-      <p:font typeface="Roboto Slab Regular" panose="020B0604020202020204" charset="0"/>
+      <p:font typeface="Barlow Semi Condensed" panose="020B0604020202020204" charset="0"/>
       <p:regular r:id="rId17"/>
       <p:bold r:id="rId18"/>
+      <p:italic r:id="rId19"/>
+      <p:boldItalic r:id="rId20"/>
+    </p:embeddedFont>
+    <p:embeddedFont>
+      <p:font typeface="Fira Sans Extra Condensed Medium" panose="020B0604020202020204" charset="0"/>
+      <p:regular r:id="rId21"/>
+      <p:bold r:id="rId22"/>
+      <p:italic r:id="rId23"/>
+      <p:boldItalic r:id="rId24"/>
+    </p:embeddedFont>
+    <p:embeddedFont>
+      <p:font typeface="Roboto Slab Regular" panose="020B0604020202020204" charset="0"/>
+      <p:regular r:id="rId25"/>
+      <p:bold r:id="rId26"/>
     </p:embeddedFont>
     <p:embeddedFont>
       <p:font typeface="Squada One" panose="020B0604020202020204" charset="0"/>
-      <p:regular r:id="rId19"/>
+      <p:regular r:id="rId27"/>
     </p:embeddedFont>
     <p:embeddedFont>
-      <p:font typeface="Barlow Semi Condensed" panose="020B0604020202020204" charset="0"/>
-      <p:regular r:id="rId20"/>
-      <p:bold r:id="rId21"/>
-      <p:italic r:id="rId22"/>
-      <p:boldItalic r:id="rId23"/>
-    </p:embeddedFont>
-    <p:embeddedFont>
-      <p:font typeface="Barlow Semi Condensed Light" panose="020B0604020202020204" charset="0"/>
-      <p:regular r:id="rId24"/>
-      <p:bold r:id="rId25"/>
-      <p:italic r:id="rId26"/>
-      <p:boldItalic r:id="rId27"/>
-    </p:embeddedFont>
-    <p:embeddedFont>
-      <p:font typeface="Saira ExtraCondensed SemiBold" panose="020B0604020202020204" charset="0"/>
+      <p:font typeface="Saira Extra Condensed" panose="020B0604020202020204" charset="0"/>
       <p:regular r:id="rId28"/>
       <p:bold r:id="rId29"/>
     </p:embeddedFont>
@@ -296,6 +296,11 @@
         <p15:guide id="1" orient="horz">
           <p15:clr>
             <a:srgbClr val="9AA0A6"/>
+          </p15:clr>
+        </p15:guide>
+        <p15:guide id="2" pos="2880">
+          <p15:clr>
+            <a:srgbClr val="A4A3A4"/>
           </p15:clr>
         </p15:guide>
       </p15:sldGuideLst>
@@ -17993,7 +17998,7 @@
             </a:pPr>
             <a:r>
               <a:rPr lang="es" dirty="0" smtClean="0"/>
-              <a:t>Catégories</a:t>
+              <a:t>Interface</a:t>
             </a:r>
             <a:endParaRPr dirty="0"/>
           </a:p>
@@ -18077,7 +18082,7 @@
             </a:pPr>
             <a:r>
               <a:rPr lang="es" dirty="0" smtClean="0"/>
-              <a:t>Avoir une grosse BDD pour pouvoir trier les téléphones par marques</a:t>
+              <a:t>Améliorer l’interface utilisateur </a:t>
             </a:r>
             <a:endParaRPr dirty="0"/>
           </a:p>

</xml_diff>